<commit_message>
upload a new version of hw0311
</commit_message>
<xml_diff>
--- a/hw/hw0311.pptx
+++ b/hw/hw0311.pptx
@@ -7,8 +7,8 @@
   <p:sldIdLst>
     <p:sldId id="256" r:id="rId2"/>
     <p:sldId id="257" r:id="rId3"/>
-    <p:sldId id="260" r:id="rId4"/>
-    <p:sldId id="263" r:id="rId5"/>
+    <p:sldId id="264" r:id="rId4"/>
+    <p:sldId id="265" r:id="rId5"/>
   </p:sldIdLst>
   <p:sldSz cx="9144000" cy="6858000" type="screen4x3"/>
   <p:notesSz cx="6858000" cy="9144000"/>
@@ -283,7 +283,7 @@
           <a:p>
             <a:fld id="{AF8AC971-3AA1-44C0-AB7A-A979FAB3DBBF}" type="datetimeFigureOut">
               <a:rPr lang="zh-TW" altLang="en-US" smtClean="0"/>
-              <a:t>2014/3/14</a:t>
+              <a:t>2014/3/17</a:t>
             </a:fld>
             <a:endParaRPr lang="zh-TW" altLang="en-US"/>
           </a:p>
@@ -448,7 +448,7 @@
           <a:p>
             <a:fld id="{AF8AC971-3AA1-44C0-AB7A-A979FAB3DBBF}" type="datetimeFigureOut">
               <a:rPr lang="zh-TW" altLang="en-US" smtClean="0"/>
-              <a:t>2014/3/14</a:t>
+              <a:t>2014/3/17</a:t>
             </a:fld>
             <a:endParaRPr lang="zh-TW" altLang="en-US"/>
           </a:p>
@@ -623,7 +623,7 @@
           <a:p>
             <a:fld id="{AF8AC971-3AA1-44C0-AB7A-A979FAB3DBBF}" type="datetimeFigureOut">
               <a:rPr lang="zh-TW" altLang="en-US" smtClean="0"/>
-              <a:t>2014/3/14</a:t>
+              <a:t>2014/3/17</a:t>
             </a:fld>
             <a:endParaRPr lang="zh-TW" altLang="en-US"/>
           </a:p>
@@ -788,7 +788,7 @@
           <a:p>
             <a:fld id="{AF8AC971-3AA1-44C0-AB7A-A979FAB3DBBF}" type="datetimeFigureOut">
               <a:rPr lang="zh-TW" altLang="en-US" smtClean="0"/>
-              <a:t>2014/3/14</a:t>
+              <a:t>2014/3/17</a:t>
             </a:fld>
             <a:endParaRPr lang="zh-TW" altLang="en-US"/>
           </a:p>
@@ -1030,7 +1030,7 @@
           <a:p>
             <a:fld id="{AF8AC971-3AA1-44C0-AB7A-A979FAB3DBBF}" type="datetimeFigureOut">
               <a:rPr lang="zh-TW" altLang="en-US" smtClean="0"/>
-              <a:t>2014/3/14</a:t>
+              <a:t>2014/3/17</a:t>
             </a:fld>
             <a:endParaRPr lang="zh-TW" altLang="en-US"/>
           </a:p>
@@ -1294,7 +1294,7 @@
           <a:p>
             <a:fld id="{AF8AC971-3AA1-44C0-AB7A-A979FAB3DBBF}" type="datetimeFigureOut">
               <a:rPr lang="zh-TW" altLang="en-US" smtClean="0"/>
-              <a:t>2014/3/14</a:t>
+              <a:t>2014/3/17</a:t>
             </a:fld>
             <a:endParaRPr lang="zh-TW" altLang="en-US"/>
           </a:p>
@@ -1672,7 +1672,7 @@
           <a:p>
             <a:fld id="{AF8AC971-3AA1-44C0-AB7A-A979FAB3DBBF}" type="datetimeFigureOut">
               <a:rPr lang="zh-TW" altLang="en-US" smtClean="0"/>
-              <a:t>2014/3/14</a:t>
+              <a:t>2014/3/17</a:t>
             </a:fld>
             <a:endParaRPr lang="zh-TW" altLang="en-US"/>
           </a:p>
@@ -1822,7 +1822,7 @@
           <a:p>
             <a:fld id="{AF8AC971-3AA1-44C0-AB7A-A979FAB3DBBF}" type="datetimeFigureOut">
               <a:rPr lang="zh-TW" altLang="en-US" smtClean="0"/>
-              <a:t>2014/3/14</a:t>
+              <a:t>2014/3/17</a:t>
             </a:fld>
             <a:endParaRPr lang="zh-TW" altLang="en-US"/>
           </a:p>
@@ -1912,7 +1912,7 @@
           <a:p>
             <a:fld id="{AF8AC971-3AA1-44C0-AB7A-A979FAB3DBBF}" type="datetimeFigureOut">
               <a:rPr lang="zh-TW" altLang="en-US" smtClean="0"/>
-              <a:t>2014/3/14</a:t>
+              <a:t>2014/3/17</a:t>
             </a:fld>
             <a:endParaRPr lang="zh-TW" altLang="en-US"/>
           </a:p>
@@ -2173,7 +2173,7 @@
           <a:p>
             <a:fld id="{AF8AC971-3AA1-44C0-AB7A-A979FAB3DBBF}" type="datetimeFigureOut">
               <a:rPr lang="zh-TW" altLang="en-US" smtClean="0"/>
-              <a:t>2014/3/14</a:t>
+              <a:t>2014/3/17</a:t>
             </a:fld>
             <a:endParaRPr lang="zh-TW" altLang="en-US"/>
           </a:p>
@@ -2461,7 +2461,7 @@
           <a:p>
             <a:fld id="{AF8AC971-3AA1-44C0-AB7A-A979FAB3DBBF}" type="datetimeFigureOut">
               <a:rPr lang="zh-TW" altLang="en-US" smtClean="0"/>
-              <a:t>2014/3/14</a:t>
+              <a:t>2014/3/17</a:t>
             </a:fld>
             <a:endParaRPr lang="zh-TW" altLang="en-US"/>
           </a:p>
@@ -3232,7 +3232,7 @@
           <a:p>
             <a:fld id="{AF8AC971-3AA1-44C0-AB7A-A979FAB3DBBF}" type="datetimeFigureOut">
               <a:rPr lang="zh-TW" altLang="en-US" smtClean="0"/>
-              <a:t>2014/3/14</a:t>
+              <a:t>2014/3/17</a:t>
             </a:fld>
             <a:endParaRPr lang="zh-TW" altLang="en-US"/>
           </a:p>
@@ -4275,14 +4275,14 @@
           <p:nvPr>
             <p:extLst>
               <p:ext uri="{D42A27DB-BD31-4B8C-83A1-F6EECF244321}">
-                <p14:modId xmlns:p14="http://schemas.microsoft.com/office/powerpoint/2010/main" val="399737087"/>
+                <p14:modId xmlns:p14="http://schemas.microsoft.com/office/powerpoint/2010/main" val="767911141"/>
               </p:ext>
             </p:extLst>
           </p:nvPr>
         </p:nvGraphicFramePr>
         <p:xfrm>
-          <a:off x="683568" y="3717032"/>
-          <a:ext cx="1368152" cy="1296144"/>
+          <a:off x="1115616" y="3717032"/>
+          <a:ext cx="1959428" cy="1279245"/>
         </p:xfrm>
         <a:graphic>
           <a:graphicData uri="http://schemas.openxmlformats.org/drawingml/2006/table">
@@ -4291,9 +4291,9 @@
                 <a:tableStyleId>{775DCB02-9BB8-47FD-8907-85C794F793BA}</a:tableStyleId>
               </a:tblPr>
               <a:tblGrid>
-                <a:gridCol w="1368152"/>
+                <a:gridCol w="1959428"/>
               </a:tblGrid>
-              <a:tr h="370592">
+              <a:tr h="288717">
                 <a:tc>
                   <a:txBody>
                     <a:bodyPr/>
@@ -4314,13 +4314,40 @@
                   <a:tcPr/>
                 </a:tc>
               </a:tr>
-              <a:tr h="925552">
+              <a:tr h="913485">
                 <a:tc>
                   <a:txBody>
                     <a:bodyPr/>
                     <a:lstStyle/>
                     <a:p>
-                      <a:endParaRPr lang="zh-TW" altLang="en-US" sz="1400" dirty="0"/>
+                      <a:r>
+                        <a:rPr lang="en-US" altLang="zh-TW" sz="1400" dirty="0" err="1" smtClean="0">
+                          <a:latin typeface="Segoe UI" panose="020B0502040204020203" pitchFamily="34" charset="0"/>
+                          <a:ea typeface="Segoe UI" panose="020B0502040204020203" pitchFamily="34" charset="0"/>
+                          <a:cs typeface="Segoe UI" panose="020B0502040204020203" pitchFamily="34" charset="0"/>
+                        </a:rPr>
+                        <a:t>Ordered_Set</a:t>
+                      </a:r>
+                      <a:r>
+                        <a:rPr lang="en-US" altLang="zh-TW" sz="1400" dirty="0" smtClean="0">
+                          <a:latin typeface="Segoe UI" panose="020B0502040204020203" pitchFamily="34" charset="0"/>
+                          <a:ea typeface="Segoe UI" panose="020B0502040204020203" pitchFamily="34" charset="0"/>
+                          <a:cs typeface="Segoe UI" panose="020B0502040204020203" pitchFamily="34" charset="0"/>
+                        </a:rPr>
+                        <a:t>:</a:t>
+                      </a:r>
+                      <a:r>
+                        <a:rPr lang="en-US" altLang="zh-TW" sz="1400" baseline="0" dirty="0" smtClean="0">
+                          <a:latin typeface="Segoe UI" panose="020B0502040204020203" pitchFamily="34" charset="0"/>
+                          <a:ea typeface="Segoe UI" panose="020B0502040204020203" pitchFamily="34" charset="0"/>
+                          <a:cs typeface="Segoe UI" panose="020B0502040204020203" pitchFamily="34" charset="0"/>
+                        </a:rPr>
+                        <a:t> Point</a:t>
+                      </a:r>
+                      <a:endParaRPr lang="zh-TW" altLang="en-US" sz="1400" dirty="0">
+                        <a:latin typeface="Segoe UI" panose="020B0502040204020203" pitchFamily="34" charset="0"/>
+                        <a:cs typeface="Segoe UI" panose="020B0502040204020203" pitchFamily="34" charset="0"/>
+                      </a:endParaRPr>
                     </a:p>
                   </a:txBody>
                   <a:tcPr/>
@@ -4332,21 +4359,21 @@
       </p:graphicFrame>
       <p:graphicFrame>
         <p:nvGraphicFramePr>
-          <p:cNvPr id="9" name="表格 8"/>
+          <p:cNvPr id="5" name="表格 4"/>
           <p:cNvGraphicFramePr>
             <a:graphicFrameLocks noGrp="1"/>
           </p:cNvGraphicFramePr>
           <p:nvPr>
             <p:extLst>
               <p:ext uri="{D42A27DB-BD31-4B8C-83A1-F6EECF244321}">
-                <p14:modId xmlns:p14="http://schemas.microsoft.com/office/powerpoint/2010/main" val="337723659"/>
+                <p14:modId xmlns:p14="http://schemas.microsoft.com/office/powerpoint/2010/main" val="1690435306"/>
               </p:ext>
             </p:extLst>
           </p:nvPr>
         </p:nvGraphicFramePr>
         <p:xfrm>
-          <a:off x="6645631" y="3712313"/>
-          <a:ext cx="1368152" cy="1296144"/>
+          <a:off x="5508104" y="3717032"/>
+          <a:ext cx="1959428" cy="1279245"/>
         </p:xfrm>
         <a:graphic>
           <a:graphicData uri="http://schemas.openxmlformats.org/drawingml/2006/table">
@@ -4355,9 +4382,9 @@
                 <a:tableStyleId>{775DCB02-9BB8-47FD-8907-85C794F793BA}</a:tableStyleId>
               </a:tblPr>
               <a:tblGrid>
-                <a:gridCol w="1368152"/>
+                <a:gridCol w="1959428"/>
               </a:tblGrid>
-              <a:tr h="370592">
+              <a:tr h="288717">
                 <a:tc>
                   <a:txBody>
                     <a:bodyPr/>
@@ -4378,7 +4405,7 @@
                   <a:tcPr/>
                 </a:tc>
               </a:tr>
-              <a:tr h="925552">
+              <a:tr h="913485">
                 <a:tc>
                   <a:txBody>
                     <a:bodyPr/>
@@ -4394,230 +4421,10 @@
           </a:graphicData>
         </a:graphic>
       </p:graphicFrame>
-      <p:graphicFrame>
-        <p:nvGraphicFramePr>
-          <p:cNvPr id="10" name="表格 9"/>
-          <p:cNvGraphicFramePr>
-            <a:graphicFrameLocks noGrp="1"/>
-          </p:cNvGraphicFramePr>
-          <p:nvPr>
-            <p:extLst>
-              <p:ext uri="{D42A27DB-BD31-4B8C-83A1-F6EECF244321}">
-                <p14:modId xmlns:p14="http://schemas.microsoft.com/office/powerpoint/2010/main" val="3927578824"/>
-              </p:ext>
-            </p:extLst>
-          </p:nvPr>
-        </p:nvGraphicFramePr>
-        <p:xfrm>
-          <a:off x="3635896" y="3717032"/>
-          <a:ext cx="1440160" cy="1296144"/>
-        </p:xfrm>
-        <a:graphic>
-          <a:graphicData uri="http://schemas.openxmlformats.org/drawingml/2006/table">
-            <a:tbl>
-              <a:tblPr>
-                <a:tableStyleId>{775DCB02-9BB8-47FD-8907-85C794F793BA}</a:tableStyleId>
-              </a:tblPr>
-              <a:tblGrid>
-                <a:gridCol w="1440160"/>
-              </a:tblGrid>
-              <a:tr h="370592">
-                <a:tc>
-                  <a:txBody>
-                    <a:bodyPr/>
-                    <a:lstStyle/>
-                    <a:p>
-                      <a:pPr algn="ctr"/>
-                      <a:r>
-                        <a:rPr lang="en-US" altLang="zh-TW" dirty="0" smtClean="0">
-                          <a:latin typeface="+mn-lt"/>
-                        </a:rPr>
-                        <a:t>Ordered Set</a:t>
-                      </a:r>
-                      <a:endParaRPr lang="zh-TW" altLang="en-US" dirty="0">
-                        <a:latin typeface="+mn-lt"/>
-                      </a:endParaRPr>
-                    </a:p>
-                  </a:txBody>
-                  <a:tcPr/>
-                </a:tc>
-              </a:tr>
-              <a:tr h="925552">
-                <a:tc>
-                  <a:txBody>
-                    <a:bodyPr/>
-                    <a:lstStyle/>
-                    <a:p>
-                      <a:endParaRPr lang="zh-TW" altLang="en-US" sz="1400" dirty="0"/>
-                    </a:p>
-                  </a:txBody>
-                  <a:tcPr/>
-                </a:tc>
-              </a:tr>
-            </a:tbl>
-          </a:graphicData>
-        </a:graphic>
-      </p:graphicFrame>
-      <p:sp>
-        <p:nvSpPr>
-          <p:cNvPr id="12" name="流程圖: 決策 11"/>
-          <p:cNvSpPr/>
-          <p:nvPr/>
-        </p:nvSpPr>
-        <p:spPr>
-          <a:xfrm>
-            <a:off x="5076056" y="4288377"/>
-            <a:ext cx="144016" cy="144016"/>
-          </a:xfrm>
-          <a:prstGeom prst="flowChartDecision">
-            <a:avLst/>
-          </a:prstGeom>
-          <a:solidFill>
-            <a:schemeClr val="bg1"/>
-          </a:solidFill>
-        </p:spPr>
-        <p:style>
-          <a:lnRef idx="2">
-            <a:schemeClr val="accent1">
-              <a:shade val="50000"/>
-            </a:schemeClr>
-          </a:lnRef>
-          <a:fillRef idx="1">
-            <a:schemeClr val="accent1"/>
-          </a:fillRef>
-          <a:effectRef idx="0">
-            <a:schemeClr val="accent1"/>
-          </a:effectRef>
-          <a:fontRef idx="minor">
-            <a:schemeClr val="lt1"/>
-          </a:fontRef>
-        </p:style>
-        <p:txBody>
-          <a:bodyPr rtlCol="0" anchor="ctr"/>
-          <a:lstStyle/>
-          <a:p>
-            <a:pPr algn="ctr"/>
-            <a:endParaRPr lang="zh-TW" altLang="en-US"/>
-          </a:p>
-        </p:txBody>
-      </p:sp>
-      <p:cxnSp>
-        <p:nvCxnSpPr>
-          <p:cNvPr id="13" name="直線接點 12"/>
-          <p:cNvCxnSpPr/>
-          <p:nvPr/>
-        </p:nvCxnSpPr>
-        <p:spPr>
-          <a:xfrm>
-            <a:off x="5226416" y="4360385"/>
-            <a:ext cx="1419215" cy="0"/>
-          </a:xfrm>
-          <a:prstGeom prst="line">
-            <a:avLst/>
-          </a:prstGeom>
-          <a:ln w="15875"/>
-        </p:spPr>
-        <p:style>
-          <a:lnRef idx="1">
-            <a:schemeClr val="accent1"/>
-          </a:lnRef>
-          <a:fillRef idx="0">
-            <a:schemeClr val="accent1"/>
-          </a:fillRef>
-          <a:effectRef idx="0">
-            <a:schemeClr val="accent1"/>
-          </a:effectRef>
-          <a:fontRef idx="minor">
-            <a:schemeClr val="tx1"/>
-          </a:fontRef>
-        </p:style>
-      </p:cxnSp>
-      <p:sp>
-        <p:nvSpPr>
-          <p:cNvPr id="16" name="文字方塊 15"/>
-          <p:cNvSpPr txBox="1"/>
-          <p:nvPr/>
-        </p:nvSpPr>
-        <p:spPr>
-          <a:xfrm>
-            <a:off x="5075015" y="4052607"/>
-            <a:ext cx="280846" cy="307777"/>
-          </a:xfrm>
-          <a:prstGeom prst="rect">
-            <a:avLst/>
-          </a:prstGeom>
-          <a:noFill/>
-        </p:spPr>
-        <p:txBody>
-          <a:bodyPr wrap="none" rtlCol="0">
-            <a:spAutoFit/>
-          </a:bodyPr>
-          <a:lstStyle/>
-          <a:p>
-            <a:r>
-              <a:rPr lang="en-US" altLang="zh-TW" sz="1400" dirty="0" smtClean="0">
-                <a:latin typeface="Segoe UI" panose="020B0502040204020203" pitchFamily="34" charset="0"/>
-                <a:ea typeface="Segoe UI" panose="020B0502040204020203" pitchFamily="34" charset="0"/>
-                <a:cs typeface="Segoe UI" panose="020B0502040204020203" pitchFamily="34" charset="0"/>
-              </a:rPr>
-              <a:t>1</a:t>
-            </a:r>
-            <a:endParaRPr lang="zh-TW" altLang="en-US" sz="1400" dirty="0">
-              <a:latin typeface="Segoe UI" panose="020B0502040204020203" pitchFamily="34" charset="0"/>
-              <a:cs typeface="Segoe UI" panose="020B0502040204020203" pitchFamily="34" charset="0"/>
-            </a:endParaRPr>
-          </a:p>
-        </p:txBody>
-      </p:sp>
-      <p:sp>
-        <p:nvSpPr>
-          <p:cNvPr id="17" name="文字方塊 16"/>
-          <p:cNvSpPr txBox="1"/>
-          <p:nvPr/>
-        </p:nvSpPr>
-        <p:spPr>
-          <a:xfrm>
-            <a:off x="6157997" y="4052608"/>
-            <a:ext cx="487634" cy="307777"/>
-          </a:xfrm>
-          <a:prstGeom prst="rect">
-            <a:avLst/>
-          </a:prstGeom>
-          <a:noFill/>
-        </p:spPr>
-        <p:txBody>
-          <a:bodyPr wrap="none" rtlCol="0">
-            <a:spAutoFit/>
-          </a:bodyPr>
-          <a:lstStyle/>
-          <a:p>
-            <a:r>
-              <a:rPr lang="en-US" altLang="zh-TW" sz="1400" dirty="0">
-                <a:latin typeface="Segoe UI" panose="020B0502040204020203" pitchFamily="34" charset="0"/>
-                <a:ea typeface="Segoe UI" panose="020B0502040204020203" pitchFamily="34" charset="0"/>
-                <a:cs typeface="Segoe UI" panose="020B0502040204020203" pitchFamily="34" charset="0"/>
-              </a:rPr>
-              <a:t>1</a:t>
-            </a:r>
-            <a:r>
-              <a:rPr lang="en-US" altLang="zh-TW" sz="1400" dirty="0" smtClean="0">
-                <a:latin typeface="Segoe UI" panose="020B0502040204020203" pitchFamily="34" charset="0"/>
-                <a:ea typeface="Segoe UI" panose="020B0502040204020203" pitchFamily="34" charset="0"/>
-                <a:cs typeface="Segoe UI" panose="020B0502040204020203" pitchFamily="34" charset="0"/>
-              </a:rPr>
-              <a:t>…*</a:t>
-            </a:r>
-            <a:endParaRPr lang="zh-TW" altLang="en-US" sz="1400" dirty="0">
-              <a:latin typeface="Segoe UI" panose="020B0502040204020203" pitchFamily="34" charset="0"/>
-              <a:cs typeface="Segoe UI" panose="020B0502040204020203" pitchFamily="34" charset="0"/>
-            </a:endParaRPr>
-          </a:p>
-        </p:txBody>
-      </p:sp>
     </p:spTree>
     <p:extLst>
       <p:ext uri="{BB962C8B-B14F-4D97-AF65-F5344CB8AC3E}">
-        <p14:creationId xmlns:p14="http://schemas.microsoft.com/office/powerpoint/2010/main" val="3748873472"/>
+        <p14:creationId xmlns:p14="http://schemas.microsoft.com/office/powerpoint/2010/main" val="2859382590"/>
       </p:ext>
     </p:extLst>
   </p:cSld>
@@ -4687,13 +4494,17 @@
           <a:p>
             <a:r>
               <a:rPr lang="en-US" altLang="zh-TW" dirty="0" smtClean="0"/>
-              <a:t>A polygon is composed of </a:t>
+              <a:t>A polygon </a:t>
             </a:r>
             <a:r>
               <a:rPr lang="en-US" altLang="zh-TW" u="sng" dirty="0" smtClean="0"/>
+              <a:t>is composed of </a:t>
+            </a:r>
+            <a:r>
+              <a:rPr lang="en-US" altLang="zh-TW" dirty="0" smtClean="0"/>
               <a:t>an ordered set of points</a:t>
             </a:r>
-            <a:endParaRPr lang="zh-TW" altLang="en-US" u="sng" dirty="0"/>
+            <a:endParaRPr lang="zh-TW" altLang="en-US" dirty="0"/>
           </a:p>
         </p:txBody>
       </p:sp>
@@ -4706,14 +4517,14 @@
           <p:nvPr>
             <p:extLst>
               <p:ext uri="{D42A27DB-BD31-4B8C-83A1-F6EECF244321}">
-                <p14:modId xmlns:p14="http://schemas.microsoft.com/office/powerpoint/2010/main" val="463750671"/>
+                <p14:modId xmlns:p14="http://schemas.microsoft.com/office/powerpoint/2010/main" val="137022614"/>
               </p:ext>
             </p:extLst>
           </p:nvPr>
         </p:nvGraphicFramePr>
         <p:xfrm>
-          <a:off x="683568" y="3717032"/>
-          <a:ext cx="1368152" cy="1296144"/>
+          <a:off x="1115616" y="3717032"/>
+          <a:ext cx="1959428" cy="1279245"/>
         </p:xfrm>
         <a:graphic>
           <a:graphicData uri="http://schemas.openxmlformats.org/drawingml/2006/table">
@@ -4722,9 +4533,9 @@
                 <a:tableStyleId>{775DCB02-9BB8-47FD-8907-85C794F793BA}</a:tableStyleId>
               </a:tblPr>
               <a:tblGrid>
-                <a:gridCol w="1368152"/>
+                <a:gridCol w="1959428"/>
               </a:tblGrid>
-              <a:tr h="370592">
+              <a:tr h="288717">
                 <a:tc>
                   <a:txBody>
                     <a:bodyPr/>
@@ -4745,13 +4556,32 @@
                   <a:tcPr/>
                 </a:tc>
               </a:tr>
-              <a:tr h="925552">
+              <a:tr h="913485">
                 <a:tc>
                   <a:txBody>
                     <a:bodyPr/>
                     <a:lstStyle/>
                     <a:p>
-                      <a:endParaRPr lang="zh-TW" altLang="en-US" sz="1400" dirty="0"/>
+                      <a:r>
+                        <a:rPr lang="en-US" altLang="zh-TW" sz="1400" dirty="0" smtClean="0">
+                          <a:latin typeface="Segoe UI" panose="020B0502040204020203" pitchFamily="34" charset="0"/>
+                          <a:ea typeface="Segoe UI" panose="020B0502040204020203" pitchFamily="34" charset="0"/>
+                          <a:cs typeface="Segoe UI" panose="020B0502040204020203" pitchFamily="34" charset="0"/>
+                        </a:rPr>
+                        <a:t>Order[ ]:</a:t>
+                      </a:r>
+                      <a:r>
+                        <a:rPr lang="en-US" altLang="zh-TW" sz="1400" baseline="0" dirty="0" smtClean="0">
+                          <a:latin typeface="Segoe UI" panose="020B0502040204020203" pitchFamily="34" charset="0"/>
+                          <a:ea typeface="Segoe UI" panose="020B0502040204020203" pitchFamily="34" charset="0"/>
+                          <a:cs typeface="Segoe UI" panose="020B0502040204020203" pitchFamily="34" charset="0"/>
+                        </a:rPr>
+                        <a:t> Point</a:t>
+                      </a:r>
+                      <a:endParaRPr lang="zh-TW" altLang="en-US" sz="1400" dirty="0">
+                        <a:latin typeface="Segoe UI" panose="020B0502040204020203" pitchFamily="34" charset="0"/>
+                        <a:cs typeface="Segoe UI" panose="020B0502040204020203" pitchFamily="34" charset="0"/>
+                      </a:endParaRPr>
                     </a:p>
                   </a:txBody>
                   <a:tcPr/>
@@ -4763,21 +4593,21 @@
       </p:graphicFrame>
       <p:graphicFrame>
         <p:nvGraphicFramePr>
-          <p:cNvPr id="9" name="表格 8"/>
+          <p:cNvPr id="5" name="表格 4"/>
           <p:cNvGraphicFramePr>
             <a:graphicFrameLocks noGrp="1"/>
           </p:cNvGraphicFramePr>
           <p:nvPr>
             <p:extLst>
               <p:ext uri="{D42A27DB-BD31-4B8C-83A1-F6EECF244321}">
-                <p14:modId xmlns:p14="http://schemas.microsoft.com/office/powerpoint/2010/main" val="1271183899"/>
+                <p14:modId xmlns:p14="http://schemas.microsoft.com/office/powerpoint/2010/main" val="2235502080"/>
               </p:ext>
             </p:extLst>
           </p:nvPr>
         </p:nvGraphicFramePr>
         <p:xfrm>
-          <a:off x="6645631" y="3712313"/>
-          <a:ext cx="1368152" cy="1296144"/>
+          <a:off x="5508104" y="3717032"/>
+          <a:ext cx="1959428" cy="1279245"/>
         </p:xfrm>
         <a:graphic>
           <a:graphicData uri="http://schemas.openxmlformats.org/drawingml/2006/table">
@@ -4786,9 +4616,9 @@
                 <a:tableStyleId>{775DCB02-9BB8-47FD-8907-85C794F793BA}</a:tableStyleId>
               </a:tblPr>
               <a:tblGrid>
-                <a:gridCol w="1368152"/>
+                <a:gridCol w="1959428"/>
               </a:tblGrid>
-              <a:tr h="370592">
+              <a:tr h="288717">
                 <a:tc>
                   <a:txBody>
                     <a:bodyPr/>
@@ -4809,7 +4639,7 @@
                   <a:tcPr/>
                 </a:tc>
               </a:tr>
-              <a:tr h="925552">
+              <a:tr h="913485">
                 <a:tc>
                   <a:txBody>
                     <a:bodyPr/>
@@ -4825,70 +4655,88 @@
           </a:graphicData>
         </a:graphic>
       </p:graphicFrame>
-      <p:graphicFrame>
-        <p:nvGraphicFramePr>
-          <p:cNvPr id="10" name="表格 9"/>
-          <p:cNvGraphicFramePr>
-            <a:graphicFrameLocks noGrp="1"/>
-          </p:cNvGraphicFramePr>
-          <p:nvPr>
-            <p:extLst>
-              <p:ext uri="{D42A27DB-BD31-4B8C-83A1-F6EECF244321}">
-                <p14:modId xmlns:p14="http://schemas.microsoft.com/office/powerpoint/2010/main" val="253232454"/>
-              </p:ext>
-            </p:extLst>
-          </p:nvPr>
-        </p:nvGraphicFramePr>
-        <p:xfrm>
-          <a:off x="3635896" y="3717032"/>
-          <a:ext cx="1440160" cy="1296144"/>
-        </p:xfrm>
-        <a:graphic>
-          <a:graphicData uri="http://schemas.openxmlformats.org/drawingml/2006/table">
-            <a:tbl>
-              <a:tblPr>
-                <a:tableStyleId>{775DCB02-9BB8-47FD-8907-85C794F793BA}</a:tableStyleId>
-              </a:tblPr>
-              <a:tblGrid>
-                <a:gridCol w="1440160"/>
-              </a:tblGrid>
-              <a:tr h="370592">
-                <a:tc>
-                  <a:txBody>
-                    <a:bodyPr/>
-                    <a:lstStyle/>
-                    <a:p>
-                      <a:pPr algn="ctr"/>
-                      <a:r>
-                        <a:rPr lang="en-US" altLang="zh-TW" dirty="0" smtClean="0">
-                          <a:latin typeface="+mn-lt"/>
-                        </a:rPr>
-                        <a:t>Ordered Set</a:t>
-                      </a:r>
-                      <a:endParaRPr lang="zh-TW" altLang="en-US" dirty="0">
-                        <a:latin typeface="+mn-lt"/>
-                      </a:endParaRPr>
-                    </a:p>
-                  </a:txBody>
-                  <a:tcPr/>
-                </a:tc>
-              </a:tr>
-              <a:tr h="925552">
-                <a:tc>
-                  <a:txBody>
-                    <a:bodyPr/>
-                    <a:lstStyle/>
-                    <a:p>
-                      <a:endParaRPr lang="zh-TW" altLang="en-US" sz="1400" dirty="0"/>
-                    </a:p>
-                  </a:txBody>
-                  <a:tcPr/>
-                </a:tc>
-              </a:tr>
-            </a:tbl>
-          </a:graphicData>
-        </a:graphic>
-      </p:graphicFrame>
+      <p:sp>
+        <p:nvSpPr>
+          <p:cNvPr id="10" name="文字方塊 9"/>
+          <p:cNvSpPr txBox="1"/>
+          <p:nvPr/>
+        </p:nvSpPr>
+        <p:spPr>
+          <a:xfrm>
+            <a:off x="3100597" y="4047389"/>
+            <a:ext cx="280846" cy="307777"/>
+          </a:xfrm>
+          <a:prstGeom prst="rect">
+            <a:avLst/>
+          </a:prstGeom>
+          <a:noFill/>
+        </p:spPr>
+        <p:txBody>
+          <a:bodyPr wrap="none" rtlCol="0">
+            <a:spAutoFit/>
+          </a:bodyPr>
+          <a:lstStyle/>
+          <a:p>
+            <a:r>
+              <a:rPr lang="en-US" altLang="zh-TW" sz="1400" dirty="0" smtClean="0">
+                <a:latin typeface="Segoe UI" panose="020B0502040204020203" pitchFamily="34" charset="0"/>
+                <a:ea typeface="Segoe UI" panose="020B0502040204020203" pitchFamily="34" charset="0"/>
+                <a:cs typeface="Segoe UI" panose="020B0502040204020203" pitchFamily="34" charset="0"/>
+              </a:rPr>
+              <a:t>1</a:t>
+            </a:r>
+            <a:endParaRPr lang="zh-TW" altLang="en-US" sz="1400" dirty="0">
+              <a:latin typeface="Segoe UI" panose="020B0502040204020203" pitchFamily="34" charset="0"/>
+              <a:cs typeface="Segoe UI" panose="020B0502040204020203" pitchFamily="34" charset="0"/>
+            </a:endParaRPr>
+          </a:p>
+        </p:txBody>
+      </p:sp>
+      <p:sp>
+        <p:nvSpPr>
+          <p:cNvPr id="11" name="文字方塊 10"/>
+          <p:cNvSpPr txBox="1"/>
+          <p:nvPr/>
+        </p:nvSpPr>
+        <p:spPr>
+          <a:xfrm>
+            <a:off x="5020470" y="4047388"/>
+            <a:ext cx="487634" cy="307777"/>
+          </a:xfrm>
+          <a:prstGeom prst="rect">
+            <a:avLst/>
+          </a:prstGeom>
+          <a:noFill/>
+        </p:spPr>
+        <p:txBody>
+          <a:bodyPr wrap="none" rtlCol="0">
+            <a:spAutoFit/>
+          </a:bodyPr>
+          <a:lstStyle/>
+          <a:p>
+            <a:r>
+              <a:rPr lang="en-US" altLang="zh-TW" sz="1400" dirty="0">
+                <a:latin typeface="Segoe UI" panose="020B0502040204020203" pitchFamily="34" charset="0"/>
+                <a:ea typeface="Segoe UI" panose="020B0502040204020203" pitchFamily="34" charset="0"/>
+                <a:cs typeface="Segoe UI" panose="020B0502040204020203" pitchFamily="34" charset="0"/>
+              </a:rPr>
+              <a:t>3</a:t>
+            </a:r>
+            <a:r>
+              <a:rPr lang="en-US" altLang="zh-TW" sz="1400" smtClean="0">
+                <a:latin typeface="Segoe UI" panose="020B0502040204020203" pitchFamily="34" charset="0"/>
+                <a:ea typeface="Segoe UI" panose="020B0502040204020203" pitchFamily="34" charset="0"/>
+                <a:cs typeface="Segoe UI" panose="020B0502040204020203" pitchFamily="34" charset="0"/>
+              </a:rPr>
+              <a:t>…*</a:t>
+            </a:r>
+            <a:endParaRPr lang="zh-TW" altLang="en-US" sz="1400" dirty="0">
+              <a:latin typeface="Segoe UI" panose="020B0502040204020203" pitchFamily="34" charset="0"/>
+              <a:cs typeface="Segoe UI" panose="020B0502040204020203" pitchFamily="34" charset="0"/>
+            </a:endParaRPr>
+          </a:p>
+        </p:txBody>
+      </p:sp>
       <p:sp>
         <p:nvSpPr>
           <p:cNvPr id="12" name="流程圖: 決策 11"/>
@@ -4897,14 +4745,14 @@
         </p:nvSpPr>
         <p:spPr>
           <a:xfrm>
-            <a:off x="5076056" y="4288377"/>
+            <a:off x="3100597" y="4283158"/>
             <a:ext cx="144016" cy="144016"/>
           </a:xfrm>
           <a:prstGeom prst="flowChartDecision">
             <a:avLst/>
           </a:prstGeom>
           <a:solidFill>
-            <a:schemeClr val="bg1"/>
+            <a:schemeClr val="tx2"/>
           </a:solidFill>
         </p:spPr>
         <p:style>
@@ -4935,13 +4783,15 @@
       <p:cxnSp>
         <p:nvCxnSpPr>
           <p:cNvPr id="13" name="直線接點 12"/>
-          <p:cNvCxnSpPr/>
+          <p:cNvCxnSpPr>
+            <a:endCxn id="5" idx="1"/>
+          </p:cNvCxnSpPr>
           <p:nvPr/>
         </p:nvCxnSpPr>
         <p:spPr>
           <a:xfrm>
-            <a:off x="5226416" y="4360385"/>
-            <a:ext cx="1419215" cy="0"/>
+            <a:off x="3250957" y="4355166"/>
+            <a:ext cx="2257147" cy="1488"/>
           </a:xfrm>
           <a:prstGeom prst="line">
             <a:avLst/>
@@ -4963,237 +4813,10 @@
           </a:fontRef>
         </p:style>
       </p:cxnSp>
-      <p:sp>
-        <p:nvSpPr>
-          <p:cNvPr id="16" name="文字方塊 15"/>
-          <p:cNvSpPr txBox="1"/>
-          <p:nvPr/>
-        </p:nvSpPr>
-        <p:spPr>
-          <a:xfrm>
-            <a:off x="5075015" y="4052607"/>
-            <a:ext cx="280846" cy="307777"/>
-          </a:xfrm>
-          <a:prstGeom prst="rect">
-            <a:avLst/>
-          </a:prstGeom>
-          <a:noFill/>
-        </p:spPr>
-        <p:txBody>
-          <a:bodyPr wrap="none" rtlCol="0">
-            <a:spAutoFit/>
-          </a:bodyPr>
-          <a:lstStyle/>
-          <a:p>
-            <a:r>
-              <a:rPr lang="en-US" altLang="zh-TW" sz="1400" dirty="0" smtClean="0">
-                <a:latin typeface="Segoe UI" panose="020B0502040204020203" pitchFamily="34" charset="0"/>
-                <a:ea typeface="Segoe UI" panose="020B0502040204020203" pitchFamily="34" charset="0"/>
-                <a:cs typeface="Segoe UI" panose="020B0502040204020203" pitchFamily="34" charset="0"/>
-              </a:rPr>
-              <a:t>1</a:t>
-            </a:r>
-            <a:endParaRPr lang="zh-TW" altLang="en-US" sz="1400" dirty="0">
-              <a:latin typeface="Segoe UI" panose="020B0502040204020203" pitchFamily="34" charset="0"/>
-              <a:cs typeface="Segoe UI" panose="020B0502040204020203" pitchFamily="34" charset="0"/>
-            </a:endParaRPr>
-          </a:p>
-        </p:txBody>
-      </p:sp>
-      <p:sp>
-        <p:nvSpPr>
-          <p:cNvPr id="17" name="文字方塊 16"/>
-          <p:cNvSpPr txBox="1"/>
-          <p:nvPr/>
-        </p:nvSpPr>
-        <p:spPr>
-          <a:xfrm>
-            <a:off x="6157997" y="4052608"/>
-            <a:ext cx="487634" cy="307777"/>
-          </a:xfrm>
-          <a:prstGeom prst="rect">
-            <a:avLst/>
-          </a:prstGeom>
-          <a:noFill/>
-        </p:spPr>
-        <p:txBody>
-          <a:bodyPr wrap="none" rtlCol="0">
-            <a:spAutoFit/>
-          </a:bodyPr>
-          <a:lstStyle/>
-          <a:p>
-            <a:r>
-              <a:rPr lang="en-US" altLang="zh-TW" sz="1400" dirty="0">
-                <a:latin typeface="Segoe UI" panose="020B0502040204020203" pitchFamily="34" charset="0"/>
-                <a:ea typeface="Segoe UI" panose="020B0502040204020203" pitchFamily="34" charset="0"/>
-                <a:cs typeface="Segoe UI" panose="020B0502040204020203" pitchFamily="34" charset="0"/>
-              </a:rPr>
-              <a:t>1</a:t>
-            </a:r>
-            <a:r>
-              <a:rPr lang="en-US" altLang="zh-TW" sz="1400" dirty="0" smtClean="0">
-                <a:latin typeface="Segoe UI" panose="020B0502040204020203" pitchFamily="34" charset="0"/>
-                <a:ea typeface="Segoe UI" panose="020B0502040204020203" pitchFamily="34" charset="0"/>
-                <a:cs typeface="Segoe UI" panose="020B0502040204020203" pitchFamily="34" charset="0"/>
-              </a:rPr>
-              <a:t>…*</a:t>
-            </a:r>
-            <a:endParaRPr lang="zh-TW" altLang="en-US" sz="1400" dirty="0">
-              <a:latin typeface="Segoe UI" panose="020B0502040204020203" pitchFamily="34" charset="0"/>
-              <a:cs typeface="Segoe UI" panose="020B0502040204020203" pitchFamily="34" charset="0"/>
-            </a:endParaRPr>
-          </a:p>
-        </p:txBody>
-      </p:sp>
-      <p:sp>
-        <p:nvSpPr>
-          <p:cNvPr id="11" name="流程圖: 決策 10"/>
-          <p:cNvSpPr/>
-          <p:nvPr/>
-        </p:nvSpPr>
-        <p:spPr>
-          <a:xfrm>
-            <a:off x="2072664" y="4288377"/>
-            <a:ext cx="144016" cy="144016"/>
-          </a:xfrm>
-          <a:prstGeom prst="flowChartDecision">
-            <a:avLst/>
-          </a:prstGeom>
-        </p:spPr>
-        <p:style>
-          <a:lnRef idx="2">
-            <a:schemeClr val="accent1">
-              <a:shade val="50000"/>
-            </a:schemeClr>
-          </a:lnRef>
-          <a:fillRef idx="1">
-            <a:schemeClr val="accent1"/>
-          </a:fillRef>
-          <a:effectRef idx="0">
-            <a:schemeClr val="accent1"/>
-          </a:effectRef>
-          <a:fontRef idx="minor">
-            <a:schemeClr val="lt1"/>
-          </a:fontRef>
-        </p:style>
-        <p:txBody>
-          <a:bodyPr rtlCol="0" anchor="ctr"/>
-          <a:lstStyle/>
-          <a:p>
-            <a:pPr algn="ctr"/>
-            <a:endParaRPr lang="zh-TW" altLang="en-US"/>
-          </a:p>
-        </p:txBody>
-      </p:sp>
-      <p:cxnSp>
-        <p:nvCxnSpPr>
-          <p:cNvPr id="14" name="直線接點 13"/>
-          <p:cNvCxnSpPr/>
-          <p:nvPr/>
-        </p:nvCxnSpPr>
-        <p:spPr>
-          <a:xfrm>
-            <a:off x="2223024" y="4360385"/>
-            <a:ext cx="1419215" cy="0"/>
-          </a:xfrm>
-          <a:prstGeom prst="line">
-            <a:avLst/>
-          </a:prstGeom>
-          <a:ln w="15875"/>
-        </p:spPr>
-        <p:style>
-          <a:lnRef idx="1">
-            <a:schemeClr val="accent1"/>
-          </a:lnRef>
-          <a:fillRef idx="0">
-            <a:schemeClr val="accent1"/>
-          </a:fillRef>
-          <a:effectRef idx="0">
-            <a:schemeClr val="accent1"/>
-          </a:effectRef>
-          <a:fontRef idx="minor">
-            <a:schemeClr val="tx1"/>
-          </a:fontRef>
-        </p:style>
-      </p:cxnSp>
-      <p:sp>
-        <p:nvSpPr>
-          <p:cNvPr id="15" name="文字方塊 14"/>
-          <p:cNvSpPr txBox="1"/>
-          <p:nvPr/>
-        </p:nvSpPr>
-        <p:spPr>
-          <a:xfrm>
-            <a:off x="2058839" y="4044681"/>
-            <a:ext cx="280846" cy="307777"/>
-          </a:xfrm>
-          <a:prstGeom prst="rect">
-            <a:avLst/>
-          </a:prstGeom>
-          <a:noFill/>
-        </p:spPr>
-        <p:txBody>
-          <a:bodyPr wrap="none" rtlCol="0">
-            <a:spAutoFit/>
-          </a:bodyPr>
-          <a:lstStyle/>
-          <a:p>
-            <a:r>
-              <a:rPr lang="en-US" altLang="zh-TW" sz="1400" dirty="0" smtClean="0">
-                <a:latin typeface="Segoe UI" panose="020B0502040204020203" pitchFamily="34" charset="0"/>
-                <a:ea typeface="Segoe UI" panose="020B0502040204020203" pitchFamily="34" charset="0"/>
-                <a:cs typeface="Segoe UI" panose="020B0502040204020203" pitchFamily="34" charset="0"/>
-              </a:rPr>
-              <a:t>1</a:t>
-            </a:r>
-            <a:endParaRPr lang="zh-TW" altLang="en-US" sz="1400" dirty="0">
-              <a:latin typeface="Segoe UI" panose="020B0502040204020203" pitchFamily="34" charset="0"/>
-              <a:cs typeface="Segoe UI" panose="020B0502040204020203" pitchFamily="34" charset="0"/>
-            </a:endParaRPr>
-          </a:p>
-        </p:txBody>
-      </p:sp>
-      <p:sp>
-        <p:nvSpPr>
-          <p:cNvPr id="18" name="文字方塊 17"/>
-          <p:cNvSpPr txBox="1"/>
-          <p:nvPr/>
-        </p:nvSpPr>
-        <p:spPr>
-          <a:xfrm>
-            <a:off x="3361393" y="4043193"/>
-            <a:ext cx="280846" cy="307777"/>
-          </a:xfrm>
-          <a:prstGeom prst="rect">
-            <a:avLst/>
-          </a:prstGeom>
-          <a:noFill/>
-        </p:spPr>
-        <p:txBody>
-          <a:bodyPr wrap="none" rtlCol="0">
-            <a:spAutoFit/>
-          </a:bodyPr>
-          <a:lstStyle/>
-          <a:p>
-            <a:r>
-              <a:rPr lang="en-US" altLang="zh-TW" sz="1400" dirty="0">
-                <a:latin typeface="Segoe UI" panose="020B0502040204020203" pitchFamily="34" charset="0"/>
-                <a:ea typeface="Segoe UI" panose="020B0502040204020203" pitchFamily="34" charset="0"/>
-                <a:cs typeface="Segoe UI" panose="020B0502040204020203" pitchFamily="34" charset="0"/>
-              </a:rPr>
-              <a:t>1</a:t>
-            </a:r>
-            <a:endParaRPr lang="zh-TW" altLang="en-US" sz="1400" dirty="0">
-              <a:latin typeface="Segoe UI" panose="020B0502040204020203" pitchFamily="34" charset="0"/>
-              <a:cs typeface="Segoe UI" panose="020B0502040204020203" pitchFamily="34" charset="0"/>
-            </a:endParaRPr>
-          </a:p>
-        </p:txBody>
-      </p:sp>
     </p:spTree>
     <p:extLst>
       <p:ext uri="{BB962C8B-B14F-4D97-AF65-F5344CB8AC3E}">
-        <p14:creationId xmlns:p14="http://schemas.microsoft.com/office/powerpoint/2010/main" val="1507777483"/>
+        <p14:creationId xmlns:p14="http://schemas.microsoft.com/office/powerpoint/2010/main" val="2687651299"/>
       </p:ext>
     </p:extLst>
   </p:cSld>

</xml_diff>